<commit_message>
Update Docs and PPT
</commit_message>
<xml_diff>
--- a/SE Capstone Project Presentation - Saish Kothare.pptx
+++ b/SE Capstone Project Presentation - Saish Kothare.pptx
@@ -8,7 +8,7 @@
     <p:notesMasterId r:id="rId32"/>
   </p:notesMasterIdLst>
   <p:sldIdLst>
-    <p:sldId id="256" r:id="rId2"/>
+    <p:sldId id="286" r:id="rId2"/>
     <p:sldId id="257" r:id="rId3"/>
     <p:sldId id="258" r:id="rId4"/>
     <p:sldId id="259" r:id="rId5"/>
@@ -136,6 +136,11 @@
       </a:defRPr>
     </a:lvl9pPr>
   </p:defaultTextStyle>
+  <p:extLst>
+    <p:ext uri="{EFAFB233-063F-42B5-8137-9DF3F51BA10A}">
+      <p15:sldGuideLst xmlns:p15="http://schemas.microsoft.com/office/powerpoint/2012/main"/>
+    </p:ext>
+  </p:extLst>
 </p:presentation>
 </file>
 
@@ -5669,7 +5674,7 @@
 <dgm:dataModel xmlns:dgm="http://schemas.openxmlformats.org/drawingml/2006/diagram" xmlns:a="http://schemas.openxmlformats.org/drawingml/2006/main">
   <dgm:ptLst>
     <dgm:pt modelId="{B6E04B48-0138-4E23-BB64-B3EB5BCCDAF5}" type="doc">
-      <dgm:prSet loTypeId="urn:microsoft.com/office/officeart/2005/8/layout/vList2" loCatId="list" qsTypeId="urn:microsoft.com/office/officeart/2005/8/quickstyle/simple1" qsCatId="simple" csTypeId="urn:microsoft.com/office/officeart/2005/8/colors/accent1_2" csCatId="accent1"/>
+      <dgm:prSet loTypeId="urn:microsoft.com/office/officeart/2005/8/layout/vList2" loCatId="list" qsTypeId="urn:microsoft.com/office/officeart/2005/8/quickstyle/simple1" qsCatId="simple" csTypeId="urn:microsoft.com/office/officeart/2005/8/colors/accent1_2" csCatId="accent1" phldr="1"/>
       <dgm:spPr/>
       <dgm:t>
         <a:bodyPr/>
@@ -5687,7 +5692,7 @@
         <a:lstStyle/>
         <a:p>
           <a:r>
-            <a:rPr lang="en-US"/>
+            <a:rPr lang="en-US" dirty="0"/>
             <a:t>Empty Username: Triggers alert and prevents quiz start.</a:t>
           </a:r>
         </a:p>
@@ -5723,7 +5728,7 @@
         <a:lstStyle/>
         <a:p>
           <a:r>
-            <a:rPr lang="en-US"/>
+            <a:rPr lang="en-US" dirty="0"/>
             <a:t>Timeout Scenarios: Auto-disables options after time runs out.</a:t>
           </a:r>
         </a:p>
@@ -5759,7 +5764,7 @@
         <a:lstStyle/>
         <a:p>
           <a:r>
-            <a:rPr lang="en-US"/>
+            <a:rPr lang="en-US" dirty="0"/>
             <a:t>Incomplete Quiz Submission: Prevented partial scores from being stored.</a:t>
           </a:r>
         </a:p>
@@ -5795,7 +5800,7 @@
         <a:lstStyle/>
         <a:p>
           <a:r>
-            <a:rPr lang="en-US"/>
+            <a:rPr lang="en-US" dirty="0"/>
             <a:t>Tied Scores: Shared rank logic implemented to ensure fairness.</a:t>
           </a:r>
         </a:p>
@@ -5831,8 +5836,8 @@
         <a:lstStyle/>
         <a:p>
           <a:r>
-            <a:rPr lang="en-US"/>
-            <a:t>Repeated Renders: Fixed leaderboard duplicate rendering bugs via unique keys and state guards</a:t>
+            <a:rPr lang="en-US" dirty="0"/>
+            <a:t>Repeated Renders: Fixed leaderboard duplicate rendering bugs via unique keys and state guards.</a:t>
           </a:r>
         </a:p>
       </dgm:t>
@@ -8760,7 +8765,7 @@
             <a:buNone/>
           </a:pPr>
           <a:r>
-            <a:rPr lang="en-US" sz="2000" kern="1200"/>
+            <a:rPr lang="en-US" sz="2000" kern="1200" dirty="0"/>
             <a:t>Empty Username: Triggers alert and prevents quiz start.</a:t>
           </a:r>
         </a:p>
@@ -8838,7 +8843,7 @@
             <a:buNone/>
           </a:pPr>
           <a:r>
-            <a:rPr lang="en-US" sz="2000" kern="1200"/>
+            <a:rPr lang="en-US" sz="2000" kern="1200" dirty="0"/>
             <a:t>Timeout Scenarios: Auto-disables options after time runs out.</a:t>
           </a:r>
         </a:p>
@@ -8916,7 +8921,7 @@
             <a:buNone/>
           </a:pPr>
           <a:r>
-            <a:rPr lang="en-US" sz="2000" kern="1200"/>
+            <a:rPr lang="en-US" sz="2000" kern="1200" dirty="0"/>
             <a:t>Incomplete Quiz Submission: Prevented partial scores from being stored.</a:t>
           </a:r>
         </a:p>
@@ -8994,7 +8999,7 @@
             <a:buNone/>
           </a:pPr>
           <a:r>
-            <a:rPr lang="en-US" sz="2000" kern="1200"/>
+            <a:rPr lang="en-US" sz="2000" kern="1200" dirty="0"/>
             <a:t>Tied Scores: Shared rank logic implemented to ensure fairness.</a:t>
           </a:r>
         </a:p>
@@ -9072,8 +9077,8 @@
             <a:buNone/>
           </a:pPr>
           <a:r>
-            <a:rPr lang="en-US" sz="2000" kern="1200"/>
-            <a:t>Repeated Renders: Fixed leaderboard duplicate rendering bugs via unique keys and state guards</a:t>
+            <a:rPr lang="en-US" sz="2000" kern="1200" dirty="0"/>
+            <a:t>Repeated Renders: Fixed leaderboard duplicate rendering bugs via unique keys and state guards.</a:t>
           </a:r>
         </a:p>
       </dsp:txBody>
@@ -19533,6 +19538,14 @@
 <file path=ppt/slides/slide1.xml><?xml version="1.0" encoding="utf-8"?>
 <p:sld xmlns:a="http://schemas.openxmlformats.org/drawingml/2006/main" xmlns:r="http://schemas.openxmlformats.org/officeDocument/2006/relationships" xmlns:p="http://schemas.openxmlformats.org/presentationml/2006/main">
   <p:cSld>
+    <p:bg>
+      <p:bgPr>
+        <a:solidFill>
+          <a:schemeClr val="bg1"/>
+        </a:solidFill>
+        <a:effectLst/>
+      </p:bgPr>
+    </p:bg>
     <p:spTree>
       <p:nvGrpSpPr>
         <p:cNvPr id="1" name=""/>
@@ -19549,7 +19562,7 @@
       </p:grpSpPr>
       <p:sp useBgFill="1">
         <p:nvSpPr>
-          <p:cNvPr id="9" name="Rectangle 8">
+          <p:cNvPr id="43" name="Rectangle 42">
             <a:extLst>
               <a:ext uri="{FF2B5EF4-FFF2-40B4-BE49-F238E27FC236}">
                 <a16:creationId xmlns:a16="http://schemas.microsoft.com/office/drawing/2014/main" id="{19F9BF86-FE94-4517-B97D-026C7515E589}"/>
@@ -19618,46 +19631,55 @@
           <a:bodyPr rtlCol="0" anchor="ctr"/>
           <a:lstStyle/>
           <a:p>
-            <a:pPr marL="0" marR="0" lvl="0" indent="0" algn="ctr" defTabSz="914400" rtl="0" eaLnBrk="1" fontAlgn="auto" latinLnBrk="0" hangingPunct="1">
-              <a:lnSpc>
-                <a:spcPct val="100000"/>
-              </a:lnSpc>
-              <a:spcBef>
-                <a:spcPts val="0"/>
-              </a:spcBef>
-              <a:spcAft>
-                <a:spcPts val="0"/>
-              </a:spcAft>
-              <a:buClrTx/>
-              <a:buSzTx/>
-              <a:buFontTx/>
-              <a:buNone/>
-              <a:tabLst/>
-              <a:defRPr/>
-            </a:pPr>
-            <a:endParaRPr kumimoji="0" lang="en-US" sz="1800" b="0" i="0" u="none" strike="noStrike" kern="1200" cap="none" spc="0" normalizeH="0" baseline="0" noProof="0">
-              <a:ln>
-                <a:noFill/>
-              </a:ln>
-              <a:solidFill>
-                <a:prstClr val="white"/>
-              </a:solidFill>
-              <a:effectLst/>
-              <a:uLnTx/>
-              <a:uFillTx/>
-              <a:latin typeface="Grandview Display"/>
-              <a:ea typeface="+mn-ea"/>
-              <a:cs typeface="+mn-cs"/>
-            </a:endParaRPr>
+            <a:pPr algn="ctr"/>
+            <a:endParaRPr lang="en-US"/>
           </a:p>
         </p:txBody>
       </p:sp>
+      <p:pic>
+        <p:nvPicPr>
+          <p:cNvPr id="6" name="Picture 5" descr="A person in blue uniform holding a bat&#10;&#10;AI-generated content may be incorrect.">
+            <a:extLst>
+              <a:ext uri="{FF2B5EF4-FFF2-40B4-BE49-F238E27FC236}">
+                <a16:creationId xmlns:a16="http://schemas.microsoft.com/office/drawing/2014/main" id="{638B3CA1-619E-3372-96BA-E95E0B741DA3}"/>
+              </a:ext>
+            </a:extLst>
+          </p:cNvPr>
+          <p:cNvPicPr>
+            <a:picLocks noChangeAspect="1"/>
+          </p:cNvPicPr>
+          <p:nvPr/>
+        </p:nvPicPr>
+        <p:blipFill>
+          <a:blip r:embed="rId2">
+            <a:alphaModFix/>
+            <a:extLst>
+              <a:ext uri="{28A0092B-C50C-407E-A947-70E740481C1C}">
+                <a14:useLocalDpi xmlns:a14="http://schemas.microsoft.com/office/drawing/2010/main" val="0"/>
+              </a:ext>
+            </a:extLst>
+          </a:blip>
+          <a:srcRect t="17181" b="26569"/>
+          <a:stretch>
+            <a:fillRect/>
+          </a:stretch>
+        </p:blipFill>
+        <p:spPr>
+          <a:xfrm>
+            <a:off x="20" y="10"/>
+            <a:ext cx="12191980" cy="6857985"/>
+          </a:xfrm>
+          <a:prstGeom prst="rect">
+            <a:avLst/>
+          </a:prstGeom>
+        </p:spPr>
+      </p:pic>
       <p:sp>
         <p:nvSpPr>
-          <p:cNvPr id="11" name="Rectangle 10">
+          <p:cNvPr id="45" name="Rectangle 44">
             <a:extLst>
               <a:ext uri="{FF2B5EF4-FFF2-40B4-BE49-F238E27FC236}">
-                <a16:creationId xmlns:a16="http://schemas.microsoft.com/office/drawing/2014/main" id="{36136311-C81B-47C5-AE0A-5641A5A59520}"/>
+                <a16:creationId xmlns:a16="http://schemas.microsoft.com/office/drawing/2014/main" id="{38390362-5868-4DF6-BD74-91C728840437}"/>
               </a:ext>
               <a:ext uri="{C183D7F6-B498-43B3-948B-1728B52AA6E4}">
                 <adec:decorative xmlns:adec="http://schemas.microsoft.com/office/drawing/2017/decorative" val="1"/>
@@ -19676,24 +19698,42 @@
           </p:nvPr>
         </p:nvSpPr>
         <p:spPr>
-          <a:xfrm>
-            <a:off x="294444" y="1066800"/>
-            <a:ext cx="4682990" cy="4724400"/>
+          <a:xfrm rot="16200000">
+            <a:off x="4035382" y="-1298619"/>
+            <a:ext cx="4121238" cy="12191998"/>
           </a:xfrm>
           <a:prstGeom prst="rect">
             <a:avLst/>
           </a:prstGeom>
-          <a:solidFill>
-            <a:schemeClr val="bg1">
-              <a:alpha val="40000"/>
-            </a:schemeClr>
-          </a:solidFill>
-          <a:ln w="12700" cap="flat" cmpd="sng" algn="ctr">
+          <a:gradFill flip="none" rotWithShape="1">
+            <a:gsLst>
+              <a:gs pos="36000">
+                <a:srgbClr val="000000">
+                  <a:alpha val="26000"/>
+                </a:srgbClr>
+              </a:gs>
+              <a:gs pos="0">
+                <a:srgbClr val="000000">
+                  <a:alpha val="0"/>
+                </a:srgbClr>
+              </a:gs>
+              <a:gs pos="61000">
+                <a:srgbClr val="0E0D12">
+                  <a:alpha val="58000"/>
+                </a:srgbClr>
+              </a:gs>
+              <a:gs pos="88000">
+                <a:srgbClr val="000000">
+                  <a:alpha val="58000"/>
+                </a:srgbClr>
+              </a:gs>
+            </a:gsLst>
+            <a:lin ang="10800000" scaled="1"/>
+            <a:tileRect/>
+          </a:gradFill>
+          <a:ln>
             <a:noFill/>
-            <a:prstDash val="solid"/>
-            <a:miter lim="800000"/>
           </a:ln>
-          <a:effectLst/>
         </p:spPr>
         <p:style>
           <a:lnRef idx="2">
@@ -19715,37 +19755,8 @@
           <a:bodyPr rtlCol="0" anchor="ctr"/>
           <a:lstStyle/>
           <a:p>
-            <a:pPr marL="0" marR="0" lvl="0" indent="0" algn="ctr" defTabSz="914400" rtl="0" eaLnBrk="1" fontAlgn="auto" latinLnBrk="0" hangingPunct="1">
-              <a:lnSpc>
-                <a:spcPct val="100000"/>
-              </a:lnSpc>
-              <a:spcBef>
-                <a:spcPts val="0"/>
-              </a:spcBef>
-              <a:spcAft>
-                <a:spcPts val="0"/>
-              </a:spcAft>
-              <a:buClrTx/>
-              <a:buSzTx/>
-              <a:buFontTx/>
-              <a:buNone/>
-              <a:tabLst/>
-              <a:defRPr/>
-            </a:pPr>
-            <a:endParaRPr kumimoji="0" lang="en-US" sz="1800" b="0" i="0" u="none" strike="noStrike" kern="1200" cap="none" spc="0" normalizeH="0" baseline="0" noProof="0">
-              <a:ln>
-                <a:noFill/>
-              </a:ln>
-              <a:solidFill>
-                <a:prstClr val="white"/>
-              </a:solidFill>
-              <a:effectLst/>
-              <a:uLnTx/>
-              <a:uFillTx/>
-              <a:latin typeface="Grandview Display"/>
-              <a:ea typeface="+mn-ea"/>
-              <a:cs typeface="+mn-cs"/>
-            </a:endParaRPr>
+            <a:pPr algn="ctr"/>
+            <a:endParaRPr lang="en-US"/>
           </a:p>
         </p:txBody>
       </p:sp>
@@ -19754,7 +19765,7 @@
           <p:cNvPr id="2" name="Title 1">
             <a:extLst>
               <a:ext uri="{FF2B5EF4-FFF2-40B4-BE49-F238E27FC236}">
-                <a16:creationId xmlns:a16="http://schemas.microsoft.com/office/drawing/2014/main" id="{C9DFCE13-1770-C270-42FB-E2F3E45E8B0A}"/>
+                <a16:creationId xmlns:a16="http://schemas.microsoft.com/office/drawing/2014/main" id="{4ECD9FAB-A355-1660-6B87-545312194EAC}"/>
               </a:ext>
             </a:extLst>
           </p:cNvPr>
@@ -19767,12 +19778,12 @@
         </p:nvSpPr>
         <p:spPr>
           <a:xfrm>
-            <a:off x="804818" y="1562101"/>
-            <a:ext cx="3905203" cy="2738530"/>
+            <a:off x="914400" y="4142790"/>
+            <a:ext cx="6835698" cy="1855646"/>
           </a:xfrm>
         </p:spPr>
         <p:txBody>
-          <a:bodyPr anchor="t">
+          <a:bodyPr anchor="b">
             <a:normAutofit/>
           </a:bodyPr>
           <a:lstStyle/>
@@ -19783,10 +19794,34 @@
               </a:lnSpc>
             </a:pPr>
             <a:r>
-              <a:rPr lang="en-US" sz="4800"/>
-              <a:t>IOD Software Engineering – Capstone Project</a:t>
+              <a:rPr lang="en-AU" sz="4200">
+                <a:solidFill>
+                  <a:srgbClr val="FFFFFF"/>
+                </a:solidFill>
+              </a:rPr>
+              <a:t>IOD Software Engineering: Capstone Project </a:t>
             </a:r>
-            <a:endParaRPr lang="en-AU" sz="4800" dirty="0"/>
+            <a:r>
+              <a:rPr lang="en-AU" sz="4200" b="0">
+                <a:solidFill>
+                  <a:srgbClr val="FFFFFF"/>
+                </a:solidFill>
+              </a:rPr>
+              <a:t>- </a:t>
+            </a:r>
+            <a:r>
+              <a:rPr lang="en-AU" sz="4200">
+                <a:solidFill>
+                  <a:srgbClr val="FFFFFF"/>
+                </a:solidFill>
+              </a:rPr>
+              <a:t>Cricket Trivia Quiz App</a:t>
+            </a:r>
+            <a:endParaRPr lang="en-AU" sz="4200" dirty="0">
+              <a:solidFill>
+                <a:srgbClr val="FFFFFF"/>
+              </a:solidFill>
+            </a:endParaRPr>
           </a:p>
         </p:txBody>
       </p:sp>
@@ -19795,7 +19830,7 @@
           <p:cNvPr id="3" name="Subtitle 2">
             <a:extLst>
               <a:ext uri="{FF2B5EF4-FFF2-40B4-BE49-F238E27FC236}">
-                <a16:creationId xmlns:a16="http://schemas.microsoft.com/office/drawing/2014/main" id="{92E514DB-3E38-A4F2-611F-4C23C8B860A1}"/>
+                <a16:creationId xmlns:a16="http://schemas.microsoft.com/office/drawing/2014/main" id="{15550A4B-4C35-D3C4-B277-D807FF50CB62}"/>
               </a:ext>
             </a:extLst>
           </p:cNvPr>
@@ -19808,30 +19843,39 @@
         </p:nvSpPr>
         <p:spPr>
           <a:xfrm>
-            <a:off x="804818" y="4321622"/>
-            <a:ext cx="3816351" cy="941832"/>
+            <a:off x="8106937" y="4856468"/>
+            <a:ext cx="3211550" cy="1141964"/>
           </a:xfrm>
         </p:spPr>
         <p:txBody>
-          <a:bodyPr>
+          <a:bodyPr anchor="b">
             <a:normAutofit/>
           </a:bodyPr>
           <a:lstStyle/>
           <a:p>
+            <a:pPr algn="r"/>
             <a:r>
-              <a:rPr lang="en-US"/>
+              <a:rPr lang="en-AU">
+                <a:solidFill>
+                  <a:srgbClr val="FFFFFF"/>
+                </a:solidFill>
+              </a:rPr>
               <a:t>Saish Kothare</a:t>
             </a:r>
-            <a:endParaRPr lang="en-AU" dirty="0"/>
+            <a:endParaRPr lang="en-AU" dirty="0">
+              <a:solidFill>
+                <a:srgbClr val="FFFFFF"/>
+              </a:solidFill>
+            </a:endParaRPr>
           </a:p>
         </p:txBody>
       </p:sp>
       <p:cxnSp>
         <p:nvCxnSpPr>
-          <p:cNvPr id="13" name="Straight Connector 12">
+          <p:cNvPr id="47" name="Straight Connector 46">
             <a:extLst>
               <a:ext uri="{FF2B5EF4-FFF2-40B4-BE49-F238E27FC236}">
-                <a16:creationId xmlns:a16="http://schemas.microsoft.com/office/drawing/2014/main" id="{7CC73A33-65FF-41A9-A3B0-006753CD1028}"/>
+                <a16:creationId xmlns:a16="http://schemas.microsoft.com/office/drawing/2014/main" id="{8A5C8BF2-C035-4BFF-8802-A39723834415}"/>
               </a:ext>
               <a:ext uri="{C183D7F6-B498-43B3-948B-1728B52AA6E4}">
                 <adec:decorative xmlns:adec="http://schemas.microsoft.com/office/drawing/2017/decorative" val="1"/>
@@ -19850,9 +19894,9 @@
           </p:nvPr>
         </p:nvCxnSpPr>
         <p:spPr>
-          <a:xfrm rot="10800000" flipV="1">
-            <a:off x="305077" y="1063752"/>
-            <a:ext cx="0" cy="4727448"/>
+          <a:xfrm>
+            <a:off x="992570" y="6272784"/>
+            <a:ext cx="10208830" cy="0"/>
           </a:xfrm>
           <a:prstGeom prst="line">
             <a:avLst/>
@@ -19877,152 +19921,13 @@
     </p:spTree>
     <p:extLst>
       <p:ext uri="{BB962C8B-B14F-4D97-AF65-F5344CB8AC3E}">
-        <p14:creationId xmlns:p14="http://schemas.microsoft.com/office/powerpoint/2010/main" val="2442224047"/>
+        <p14:creationId xmlns:p14="http://schemas.microsoft.com/office/powerpoint/2010/main" val="4195744418"/>
       </p:ext>
     </p:extLst>
   </p:cSld>
   <p:clrMapOvr>
     <a:overrideClrMapping bg1="dk1" tx1="lt1" bg2="dk2" tx2="lt2" accent1="accent1" accent2="accent2" accent3="accent3" accent4="accent4" accent5="accent5" accent6="accent6" hlink="hlink" folHlink="folHlink"/>
   </p:clrMapOvr>
-  <p:timing>
-    <p:tnLst>
-      <p:par>
-        <p:cTn id="1" dur="indefinite" restart="never" nodeType="tmRoot">
-          <p:childTnLst>
-            <p:seq concurrent="1" nextAc="seek">
-              <p:cTn id="2" dur="indefinite" nodeType="mainSeq">
-                <p:childTnLst>
-                  <p:par>
-                    <p:cTn id="3" fill="hold">
-                      <p:stCondLst>
-                        <p:cond delay="indefinite"/>
-                        <p:cond evt="onBegin" delay="0">
-                          <p:tn val="2"/>
-                        </p:cond>
-                      </p:stCondLst>
-                      <p:childTnLst>
-                        <p:par>
-                          <p:cTn id="4" fill="hold">
-                            <p:stCondLst>
-                              <p:cond delay="0"/>
-                            </p:stCondLst>
-                            <p:childTnLst>
-                              <p:par>
-                                <p:cTn id="5" presetID="10" presetClass="entr" presetSubtype="0" fill="hold" grpId="0" nodeType="withEffect">
-                                  <p:stCondLst>
-                                    <p:cond delay="1000"/>
-                                  </p:stCondLst>
-                                  <p:iterate>
-                                    <p:tmPct val="10000"/>
-                                  </p:iterate>
-                                  <p:childTnLst>
-                                    <p:set>
-                                      <p:cBhvr>
-                                        <p:cTn id="6" dur="1" fill="hold">
-                                          <p:stCondLst>
-                                            <p:cond delay="0"/>
-                                          </p:stCondLst>
-                                        </p:cTn>
-                                        <p:tgtEl>
-                                          <p:spTgt spid="2"/>
-                                        </p:tgtEl>
-                                        <p:attrNameLst>
-                                          <p:attrName>style.visibility</p:attrName>
-                                        </p:attrNameLst>
-                                      </p:cBhvr>
-                                      <p:to>
-                                        <p:strVal val="visible"/>
-                                      </p:to>
-                                    </p:set>
-                                    <p:animEffect transition="in" filter="fade">
-                                      <p:cBhvr>
-                                        <p:cTn id="7" dur="700"/>
-                                        <p:tgtEl>
-                                          <p:spTgt spid="2"/>
-                                        </p:tgtEl>
-                                      </p:cBhvr>
-                                    </p:animEffect>
-                                  </p:childTnLst>
-                                </p:cTn>
-                              </p:par>
-                              <p:par>
-                                <p:cTn id="8" presetID="10" presetClass="entr" presetSubtype="0" fill="hold" grpId="0" nodeType="withEffect">
-                                  <p:stCondLst>
-                                    <p:cond delay="1500"/>
-                                  </p:stCondLst>
-                                  <p:iterate>
-                                    <p:tmPct val="10000"/>
-                                  </p:iterate>
-                                  <p:childTnLst>
-                                    <p:set>
-                                      <p:cBhvr>
-                                        <p:cTn id="9" dur="1" fill="hold">
-                                          <p:stCondLst>
-                                            <p:cond delay="0"/>
-                                          </p:stCondLst>
-                                        </p:cTn>
-                                        <p:tgtEl>
-                                          <p:spTgt spid="3">
-                                            <p:txEl>
-                                              <p:pRg st="0" end="0"/>
-                                            </p:txEl>
-                                          </p:spTgt>
-                                        </p:tgtEl>
-                                        <p:attrNameLst>
-                                          <p:attrName>style.visibility</p:attrName>
-                                        </p:attrNameLst>
-                                      </p:cBhvr>
-                                      <p:to>
-                                        <p:strVal val="visible"/>
-                                      </p:to>
-                                    </p:set>
-                                    <p:animEffect transition="in" filter="fade">
-                                      <p:cBhvr>
-                                        <p:cTn id="10" dur="700"/>
-                                        <p:tgtEl>
-                                          <p:spTgt spid="3">
-                                            <p:txEl>
-                                              <p:pRg st="0" end="0"/>
-                                            </p:txEl>
-                                          </p:spTgt>
-                                        </p:tgtEl>
-                                      </p:cBhvr>
-                                    </p:animEffect>
-                                  </p:childTnLst>
-                                </p:cTn>
-                              </p:par>
-                            </p:childTnLst>
-                          </p:cTn>
-                        </p:par>
-                      </p:childTnLst>
-                    </p:cTn>
-                  </p:par>
-                </p:childTnLst>
-              </p:cTn>
-              <p:prevCondLst>
-                <p:cond evt="onPrev" delay="0">
-                  <p:tgtEl>
-                    <p:sldTgt/>
-                  </p:tgtEl>
-                </p:cond>
-              </p:prevCondLst>
-              <p:nextCondLst>
-                <p:cond evt="onNext" delay="0">
-                  <p:tgtEl>
-                    <p:sldTgt/>
-                  </p:tgtEl>
-                </p:cond>
-              </p:nextCondLst>
-            </p:seq>
-          </p:childTnLst>
-        </p:cTn>
-      </p:par>
-    </p:tnLst>
-    <p:bldLst>
-      <p:bldP spid="2" grpId="0"/>
-      <p:bldP spid="3" grpId="0" build="p"/>
-    </p:bldLst>
-  </p:timing>
 </p:sld>
 </file>
 
@@ -25612,10 +25517,10 @@
           <a:lstStyle/>
           <a:p>
             <a:r>
-              <a:rPr lang="en-US" sz="3700"/>
+              <a:rPr lang="en-US" sz="3700" dirty="0"/>
               <a:t>Testing Strategy – Steps to Ensure Product Quality</a:t>
             </a:r>
-            <a:endParaRPr lang="en-AU" sz="3700"/>
+            <a:endParaRPr lang="en-AU" sz="3700" dirty="0"/>
           </a:p>
         </p:txBody>
       </p:sp>
@@ -26133,6 +26038,11 @@
           </p:cNvGraphicFramePr>
           <p:nvPr>
             <p:ph idx="1"/>
+            <p:extLst>
+              <p:ext uri="{D42A27DB-BD31-4B8C-83A1-F6EECF244321}">
+                <p14:modId xmlns:p14="http://schemas.microsoft.com/office/powerpoint/2010/main" val="4165055315"/>
+              </p:ext>
+            </p:extLst>
           </p:nvPr>
         </p:nvGraphicFramePr>
         <p:xfrm>

</xml_diff>